<commit_message>
Update Diagram with new fields
</commit_message>
<xml_diff>
--- a/documentation/idioms/identity-group/diagram.pptx
+++ b/documentation/idioms/identity-group/diagram.pptx
@@ -104,6 +104,22 @@
       </a:defRPr>
     </a:lvl9pPr>
   </p:defaultTextStyle>
+  <p:extLst>
+    <p:ext uri="{EFAFB233-063F-42B5-8137-9DF3F51BA10A}">
+      <p15:sldGuideLst xmlns:p15="http://schemas.microsoft.com/office/powerpoint/2012/main">
+        <p15:guide id="1" orient="horz" pos="2160">
+          <p15:clr>
+            <a:srgbClr val="A4A3A4"/>
+          </p15:clr>
+        </p15:guide>
+        <p15:guide id="2" pos="2880">
+          <p15:clr>
+            <a:srgbClr val="A4A3A4"/>
+          </p15:clr>
+        </p15:guide>
+      </p15:sldGuideLst>
+    </p:ext>
+  </p:extLst>
 </p:presentation>
 </file>
 
@@ -288,7 +304,7 @@
           <a:p>
             <a:fld id="{13F24B86-36D2-4655-BE2F-98B661AC85E1}" type="datetimeFigureOut">
               <a:rPr lang="en-US" smtClean="0"/>
-              <a:t>3/30/14</a:t>
+              <a:t>3/18/2015</a:t>
             </a:fld>
             <a:endParaRPr lang="en-US"/>
           </a:p>
@@ -458,7 +474,7 @@
           <a:p>
             <a:fld id="{13F24B86-36D2-4655-BE2F-98B661AC85E1}" type="datetimeFigureOut">
               <a:rPr lang="en-US" smtClean="0"/>
-              <a:t>3/30/14</a:t>
+              <a:t>3/18/2015</a:t>
             </a:fld>
             <a:endParaRPr lang="en-US"/>
           </a:p>
@@ -638,7 +654,7 @@
           <a:p>
             <a:fld id="{13F24B86-36D2-4655-BE2F-98B661AC85E1}" type="datetimeFigureOut">
               <a:rPr lang="en-US" smtClean="0"/>
-              <a:t>3/30/14</a:t>
+              <a:t>3/18/2015</a:t>
             </a:fld>
             <a:endParaRPr lang="en-US"/>
           </a:p>
@@ -808,7 +824,7 @@
           <a:p>
             <a:fld id="{13F24B86-36D2-4655-BE2F-98B661AC85E1}" type="datetimeFigureOut">
               <a:rPr lang="en-US" smtClean="0"/>
-              <a:t>3/30/14</a:t>
+              <a:t>3/18/2015</a:t>
             </a:fld>
             <a:endParaRPr lang="en-US"/>
           </a:p>
@@ -1054,7 +1070,7 @@
           <a:p>
             <a:fld id="{13F24B86-36D2-4655-BE2F-98B661AC85E1}" type="datetimeFigureOut">
               <a:rPr lang="en-US" smtClean="0"/>
-              <a:t>3/30/14</a:t>
+              <a:t>3/18/2015</a:t>
             </a:fld>
             <a:endParaRPr lang="en-US"/>
           </a:p>
@@ -1342,7 +1358,7 @@
           <a:p>
             <a:fld id="{13F24B86-36D2-4655-BE2F-98B661AC85E1}" type="datetimeFigureOut">
               <a:rPr lang="en-US" smtClean="0"/>
-              <a:t>3/30/14</a:t>
+              <a:t>3/18/2015</a:t>
             </a:fld>
             <a:endParaRPr lang="en-US"/>
           </a:p>
@@ -1764,7 +1780,7 @@
           <a:p>
             <a:fld id="{13F24B86-36D2-4655-BE2F-98B661AC85E1}" type="datetimeFigureOut">
               <a:rPr lang="en-US" smtClean="0"/>
-              <a:t>3/30/14</a:t>
+              <a:t>3/18/2015</a:t>
             </a:fld>
             <a:endParaRPr lang="en-US"/>
           </a:p>
@@ -1882,7 +1898,7 @@
           <a:p>
             <a:fld id="{13F24B86-36D2-4655-BE2F-98B661AC85E1}" type="datetimeFigureOut">
               <a:rPr lang="en-US" smtClean="0"/>
-              <a:t>3/30/14</a:t>
+              <a:t>3/18/2015</a:t>
             </a:fld>
             <a:endParaRPr lang="en-US"/>
           </a:p>
@@ -1977,7 +1993,7 @@
           <a:p>
             <a:fld id="{13F24B86-36D2-4655-BE2F-98B661AC85E1}" type="datetimeFigureOut">
               <a:rPr lang="en-US" smtClean="0"/>
-              <a:t>3/30/14</a:t>
+              <a:t>3/18/2015</a:t>
             </a:fld>
             <a:endParaRPr lang="en-US"/>
           </a:p>
@@ -2254,7 +2270,7 @@
           <a:p>
             <a:fld id="{13F24B86-36D2-4655-BE2F-98B661AC85E1}" type="datetimeFigureOut">
               <a:rPr lang="en-US" smtClean="0"/>
-              <a:t>3/30/14</a:t>
+              <a:t>3/18/2015</a:t>
             </a:fld>
             <a:endParaRPr lang="en-US"/>
           </a:p>
@@ -2507,7 +2523,7 @@
           <a:p>
             <a:fld id="{13F24B86-36D2-4655-BE2F-98B661AC85E1}" type="datetimeFigureOut">
               <a:rPr lang="en-US" smtClean="0"/>
-              <a:t>3/30/14</a:t>
+              <a:t>3/18/2015</a:t>
             </a:fld>
             <a:endParaRPr lang="en-US"/>
           </a:p>
@@ -2720,7 +2736,7 @@
           <a:p>
             <a:fld id="{13F24B86-36D2-4655-BE2F-98B661AC85E1}" type="datetimeFigureOut">
               <a:rPr lang="en-US" smtClean="0"/>
-              <a:t>3/30/14</a:t>
+              <a:t>3/18/2015</a:t>
             </a:fld>
             <a:endParaRPr lang="en-US"/>
           </a:p>
@@ -3104,14 +3120,14 @@
           <p:nvPr>
             <p:extLst>
               <p:ext uri="{D42A27DB-BD31-4B8C-83A1-F6EECF244321}">
-                <p14:modId xmlns:p14="http://schemas.microsoft.com/office/powerpoint/2010/main" val="2693691214"/>
+                <p14:modId xmlns:p14="http://schemas.microsoft.com/office/powerpoint/2010/main" val="2329203657"/>
               </p:ext>
             </p:extLst>
           </p:nvPr>
         </p:nvGraphicFramePr>
         <p:xfrm>
           <a:off x="831307" y="723881"/>
-          <a:ext cx="6283868" cy="4998720"/>
+          <a:ext cx="6283868" cy="5516880"/>
         </p:xfrm>
         <a:graphic>
           <a:graphicData uri="http://schemas.openxmlformats.org/drawingml/2006/table">
@@ -3933,11 +3949,7 @@
                       </a:r>
                       <a:r>
                         <a:rPr lang="en-US" sz="1100" b="0" baseline="0" dirty="0" smtClean="0"/>
-                        <a:t>     </a:t>
-                      </a:r>
-                      <a:r>
-                        <a:rPr lang="en-US" sz="1100" b="0" baseline="0" dirty="0" smtClean="0"/>
-                        <a:t>Type</a:t>
+                        <a:t>     Type</a:t>
                       </a:r>
                       <a:endParaRPr lang="en-US" sz="1100" b="0" dirty="0"/>
                     </a:p>
@@ -4295,11 +4307,7 @@
                       </a:r>
                       <a:r>
                         <a:rPr lang="en-US" sz="1100" b="0" baseline="0" dirty="0" smtClean="0"/>
-                        <a:t>     </a:t>
-                      </a:r>
-                      <a:r>
-                        <a:rPr lang="en-US" sz="1100" b="0" baseline="0" dirty="0" smtClean="0"/>
-                        <a:t>Type</a:t>
+                        <a:t>     Type</a:t>
                       </a:r>
                       <a:endParaRPr lang="en-US" sz="1100" b="0" dirty="0"/>
                     </a:p>
@@ -4721,6 +4729,274 @@
                       <a:r>
                         <a:rPr lang="en-US" sz="1100" dirty="0" smtClean="0"/>
                         <a:t>disco-team@stealthemail.com</a:t>
+                      </a:r>
+                      <a:endParaRPr lang="en-US" sz="1100" b="0" dirty="0" smtClean="0"/>
+                    </a:p>
+                  </a:txBody>
+                  <a:tcPr>
+                    <a:lnL w="12700" cap="flat" cmpd="sng" algn="ctr">
+                      <a:solidFill>
+                        <a:schemeClr val="tx1"/>
+                      </a:solidFill>
+                      <a:prstDash val="solid"/>
+                      <a:round/>
+                      <a:headEnd type="none" w="med" len="med"/>
+                      <a:tailEnd type="none" w="med" len="med"/>
+                    </a:lnL>
+                    <a:lnR w="12700" cap="flat" cmpd="sng" algn="ctr">
+                      <a:solidFill>
+                        <a:schemeClr val="tx1"/>
+                      </a:solidFill>
+                      <a:prstDash val="solid"/>
+                      <a:round/>
+                      <a:headEnd type="none" w="med" len="med"/>
+                      <a:tailEnd type="none" w="med" len="med"/>
+                    </a:lnR>
+                    <a:lnT w="12700" cap="flat" cmpd="sng" algn="ctr">
+                      <a:noFill/>
+                      <a:prstDash val="solid"/>
+                      <a:round/>
+                      <a:headEnd type="none" w="med" len="med"/>
+                      <a:tailEnd type="none" w="med" len="med"/>
+                    </a:lnT>
+                    <a:lnB w="12700" cap="flat" cmpd="sng" algn="ctr">
+                      <a:noFill/>
+                      <a:prstDash val="solid"/>
+                      <a:round/>
+                      <a:headEnd type="none" w="med" len="med"/>
+                      <a:tailEnd type="none" w="med" len="med"/>
+                    </a:lnB>
+                    <a:lnTlToBr w="12700" cmpd="sng">
+                      <a:noFill/>
+                      <a:prstDash val="solid"/>
+                    </a:lnTlToBr>
+                    <a:lnBlToTr w="12700" cmpd="sng">
+                      <a:noFill/>
+                      <a:prstDash val="solid"/>
+                    </a:lnBlToTr>
+                  </a:tcPr>
+                </a:tc>
+                <a:tc hMerge="1">
+                  <a:txBody>
+                    <a:bodyPr/>
+                    <a:lstStyle/>
+                    <a:p>
+                      <a:endParaRPr lang="en-US"/>
+                    </a:p>
+                  </a:txBody>
+                  <a:tcPr/>
+                </a:tc>
+              </a:tr>
+              <a:tr h="144405">
+                <a:tc>
+                  <a:txBody>
+                    <a:bodyPr/>
+                    <a:lstStyle/>
+                    <a:p>
+                      <a:pPr lvl="0"/>
+                      <a:r>
+                        <a:rPr lang="en-US" sz="1100" b="0" dirty="0" smtClean="0"/>
+                        <a:t>        </a:t>
+                      </a:r>
+                      <a:r>
+                        <a:rPr lang="en-US" sz="1100" b="0" dirty="0" err="1" smtClean="0"/>
+                        <a:t>ElectronicAddressIdentifier</a:t>
+                      </a:r>
+                      <a:endParaRPr lang="en-US" sz="1100" b="0" dirty="0"/>
+                    </a:p>
+                  </a:txBody>
+                  <a:tcPr>
+                    <a:lnL w="12700" cap="flat" cmpd="sng" algn="ctr">
+                      <a:solidFill>
+                        <a:schemeClr val="tx1"/>
+                      </a:solidFill>
+                      <a:prstDash val="solid"/>
+                      <a:round/>
+                      <a:headEnd type="none" w="med" len="med"/>
+                      <a:tailEnd type="none" w="med" len="med"/>
+                    </a:lnL>
+                    <a:lnR w="12700" cap="flat" cmpd="sng" algn="ctr">
+                      <a:solidFill>
+                        <a:schemeClr val="tx1"/>
+                      </a:solidFill>
+                      <a:prstDash val="solid"/>
+                      <a:round/>
+                      <a:headEnd type="none" w="med" len="med"/>
+                      <a:tailEnd type="none" w="med" len="med"/>
+                    </a:lnR>
+                  </a:tcPr>
+                </a:tc>
+                <a:tc gridSpan="2">
+                  <a:txBody>
+                    <a:bodyPr/>
+                    <a:lstStyle/>
+                    <a:p>
+                      <a:pPr marL="0" marR="0" indent="0" algn="l" defTabSz="914400" rtl="0" eaLnBrk="1" fontAlgn="auto" latinLnBrk="0" hangingPunct="1">
+                        <a:lnSpc>
+                          <a:spcPct val="100000"/>
+                        </a:lnSpc>
+                        <a:spcBef>
+                          <a:spcPts val="0"/>
+                        </a:spcBef>
+                        <a:spcAft>
+                          <a:spcPts val="0"/>
+                        </a:spcAft>
+                        <a:buClrTx/>
+                        <a:buSzTx/>
+                        <a:buFontTx/>
+                        <a:buNone/>
+                        <a:tabLst/>
+                        <a:defRPr/>
+                      </a:pPr>
+                      <a:r>
+                        <a:rPr lang="en-US" sz="1100" dirty="0" smtClean="0"/>
+                        <a:t>facebook.com/</a:t>
+                      </a:r>
+                      <a:r>
+                        <a:rPr lang="en-US" sz="1100" dirty="0" err="1" smtClean="0"/>
+                        <a:t>thediscoteam</a:t>
+                      </a:r>
+                      <a:endParaRPr lang="en-US" sz="1100" b="0" dirty="0" smtClean="0"/>
+                    </a:p>
+                  </a:txBody>
+                  <a:tcPr>
+                    <a:lnL w="12700" cap="flat" cmpd="sng" algn="ctr">
+                      <a:solidFill>
+                        <a:schemeClr val="tx1"/>
+                      </a:solidFill>
+                      <a:prstDash val="solid"/>
+                      <a:round/>
+                      <a:headEnd type="none" w="med" len="med"/>
+                      <a:tailEnd type="none" w="med" len="med"/>
+                    </a:lnL>
+                    <a:lnR w="12700" cap="flat" cmpd="sng" algn="ctr">
+                      <a:solidFill>
+                        <a:schemeClr val="tx1"/>
+                      </a:solidFill>
+                      <a:prstDash val="solid"/>
+                      <a:round/>
+                      <a:headEnd type="none" w="med" len="med"/>
+                      <a:tailEnd type="none" w="med" len="med"/>
+                    </a:lnR>
+                    <a:lnT w="12700" cap="flat" cmpd="sng" algn="ctr">
+                      <a:noFill/>
+                      <a:prstDash val="solid"/>
+                      <a:round/>
+                      <a:headEnd type="none" w="med" len="med"/>
+                      <a:tailEnd type="none" w="med" len="med"/>
+                    </a:lnT>
+                    <a:lnB w="12700" cap="flat" cmpd="sng" algn="ctr">
+                      <a:noFill/>
+                      <a:prstDash val="solid"/>
+                      <a:round/>
+                      <a:headEnd type="none" w="med" len="med"/>
+                      <a:tailEnd type="none" w="med" len="med"/>
+                    </a:lnB>
+                    <a:lnTlToBr w="12700" cmpd="sng">
+                      <a:noFill/>
+                      <a:prstDash val="solid"/>
+                    </a:lnTlToBr>
+                    <a:lnBlToTr w="12700" cmpd="sng">
+                      <a:noFill/>
+                      <a:prstDash val="solid"/>
+                    </a:lnBlToTr>
+                  </a:tcPr>
+                </a:tc>
+                <a:tc hMerge="1">
+                  <a:txBody>
+                    <a:bodyPr/>
+                    <a:lstStyle/>
+                    <a:p>
+                      <a:endParaRPr lang="en-US"/>
+                    </a:p>
+                  </a:txBody>
+                  <a:tcPr/>
+                </a:tc>
+              </a:tr>
+              <a:tr h="144405">
+                <a:tc>
+                  <a:txBody>
+                    <a:bodyPr/>
+                    <a:lstStyle/>
+                    <a:p>
+                      <a:pPr marL="0" marR="0" lvl="0" indent="0" algn="l" defTabSz="914400" rtl="0" eaLnBrk="1" fontAlgn="auto" latinLnBrk="0" hangingPunct="1">
+                        <a:lnSpc>
+                          <a:spcPct val="100000"/>
+                        </a:lnSpc>
+                        <a:spcBef>
+                          <a:spcPts val="0"/>
+                        </a:spcBef>
+                        <a:spcAft>
+                          <a:spcPts val="0"/>
+                        </a:spcAft>
+                        <a:buClrTx/>
+                        <a:buSzTx/>
+                        <a:buFontTx/>
+                        <a:buNone/>
+                        <a:tabLst/>
+                        <a:defRPr/>
+                      </a:pPr>
+                      <a:r>
+                        <a:rPr lang="en-US" sz="1100" b="0" dirty="0" smtClean="0"/>
+                        <a:t>        </a:t>
+                      </a:r>
+                      <a:r>
+                        <a:rPr lang="en-US" sz="1100" b="0" dirty="0" err="1" smtClean="0"/>
+                        <a:t>ElectronicAddressIdentifier</a:t>
+                      </a:r>
+                      <a:endParaRPr lang="en-US" sz="1100" b="0" dirty="0" smtClean="0"/>
+                    </a:p>
+                  </a:txBody>
+                  <a:tcPr>
+                    <a:lnL w="12700" cap="flat" cmpd="sng" algn="ctr">
+                      <a:solidFill>
+                        <a:schemeClr val="tx1"/>
+                      </a:solidFill>
+                      <a:prstDash val="solid"/>
+                      <a:round/>
+                      <a:headEnd type="none" w="med" len="med"/>
+                      <a:tailEnd type="none" w="med" len="med"/>
+                    </a:lnL>
+                    <a:lnR w="12700" cap="flat" cmpd="sng" algn="ctr">
+                      <a:solidFill>
+                        <a:schemeClr val="tx1"/>
+                      </a:solidFill>
+                      <a:prstDash val="solid"/>
+                      <a:round/>
+                      <a:headEnd type="none" w="med" len="med"/>
+                      <a:tailEnd type="none" w="med" len="med"/>
+                    </a:lnR>
+                  </a:tcPr>
+                </a:tc>
+                <a:tc gridSpan="2">
+                  <a:txBody>
+                    <a:bodyPr/>
+                    <a:lstStyle/>
+                    <a:p>
+                      <a:pPr marL="0" marR="0" indent="0" algn="l" defTabSz="914400" rtl="0" eaLnBrk="1" fontAlgn="auto" latinLnBrk="0" hangingPunct="1">
+                        <a:lnSpc>
+                          <a:spcPct val="100000"/>
+                        </a:lnSpc>
+                        <a:spcBef>
+                          <a:spcPts val="0"/>
+                        </a:spcBef>
+                        <a:spcAft>
+                          <a:spcPts val="0"/>
+                        </a:spcAft>
+                        <a:buClrTx/>
+                        <a:buSzTx/>
+                        <a:buFontTx/>
+                        <a:buNone/>
+                        <a:tabLst/>
+                        <a:defRPr/>
+                      </a:pPr>
+                      <a:r>
+                        <a:rPr lang="en-US" sz="1100" dirty="0" smtClean="0"/>
+                        <a:t>twitter.com/</a:t>
+                      </a:r>
+                      <a:r>
+                        <a:rPr lang="en-US" sz="1100" dirty="0" err="1" smtClean="0"/>
+                        <a:t>realdiscoteam</a:t>
                       </a:r>
                       <a:endParaRPr lang="en-US" sz="1100" b="0" dirty="0" smtClean="0"/>
                     </a:p>

</xml_diff>